<commit_message>
update reward distribution for stochastic and volatile blocks
</commit_message>
<xml_diff>
--- a/images/instructions/manipulation_question_inst_v2.pptx
+++ b/images/instructions/manipulation_question_inst_v2.pptx
@@ -5,13 +5,12 @@
     <p:sldMasterId id="2147483648" r:id="rId1"/>
   </p:sldMasterIdLst>
   <p:notesMasterIdLst>
-    <p:notesMasterId r:id="rId6"/>
+    <p:notesMasterId r:id="rId5"/>
   </p:notesMasterIdLst>
   <p:sldIdLst>
     <p:sldId id="334" r:id="rId2"/>
-    <p:sldId id="357" r:id="rId3"/>
-    <p:sldId id="332" r:id="rId4"/>
-    <p:sldId id="358" r:id="rId5"/>
+    <p:sldId id="332" r:id="rId3"/>
+    <p:sldId id="358" r:id="rId4"/>
   </p:sldIdLst>
   <p:sldSz cx="12192000" cy="6858000"/>
   <p:notesSz cx="6858000" cy="9144000"/>
@@ -1316,714 +1315,6 @@
   <p:cSld>
     <p:spTree>
       <p:nvGrpSpPr>
-        <p:cNvPr id="1" name="">
-          <a:extLst>
-            <a:ext uri="{FF2B5EF4-FFF2-40B4-BE49-F238E27FC236}">
-              <a16:creationId xmlns:a16="http://schemas.microsoft.com/office/drawing/2014/main" id="{BC3E915D-6871-13F8-5064-310208D52755}"/>
-            </a:ext>
-          </a:extLst>
-        </p:cNvPr>
-        <p:cNvGrpSpPr/>
-        <p:nvPr/>
-      </p:nvGrpSpPr>
-      <p:grpSpPr>
-        <a:xfrm>
-          <a:off x="0" y="0"/>
-          <a:ext cx="0" cy="0"/>
-          <a:chOff x="0" y="0"/>
-          <a:chExt cx="0" cy="0"/>
-        </a:xfrm>
-      </p:grpSpPr>
-      <p:sp>
-        <p:nvSpPr>
-          <p:cNvPr id="2" name="Slide Image Placeholder 1">
-            <a:extLst>
-              <a:ext uri="{FF2B5EF4-FFF2-40B4-BE49-F238E27FC236}">
-                <a16:creationId xmlns:a16="http://schemas.microsoft.com/office/drawing/2014/main" id="{E6A21BBD-20F2-01D1-D6B3-CB899FA703EA}"/>
-              </a:ext>
-            </a:extLst>
-          </p:cNvPr>
-          <p:cNvSpPr>
-            <a:spLocks noGrp="1" noRot="1" noChangeAspect="1"/>
-          </p:cNvSpPr>
-          <p:nvPr>
-            <p:ph type="sldImg"/>
-          </p:nvPr>
-        </p:nvSpPr>
-        <p:spPr/>
-      </p:sp>
-      <p:sp>
-        <p:nvSpPr>
-          <p:cNvPr id="3" name="Notes Placeholder 2">
-            <a:extLst>
-              <a:ext uri="{FF2B5EF4-FFF2-40B4-BE49-F238E27FC236}">
-                <a16:creationId xmlns:a16="http://schemas.microsoft.com/office/drawing/2014/main" id="{513F430C-19A8-0088-8855-242B9C8762FD}"/>
-              </a:ext>
-            </a:extLst>
-          </p:cNvPr>
-          <p:cNvSpPr>
-            <a:spLocks noGrp="1"/>
-          </p:cNvSpPr>
-          <p:nvPr>
-            <p:ph type="body" idx="1"/>
-          </p:nvPr>
-        </p:nvSpPr>
-        <p:spPr/>
-        <p:txBody>
-          <a:bodyPr/>
-          <a:lstStyle/>
-          <a:p>
-            <a:r>
-              <a:rPr lang="en-US" altLang="zh-CN" dirty="0"/>
-              <a:t>Then,</a:t>
-            </a:r>
-            <a:r>
-              <a:rPr lang="zh-CN" altLang="en-US" dirty="0"/>
-              <a:t> </a:t>
-            </a:r>
-            <a:r>
-              <a:rPr lang="en-US" altLang="zh-CN" dirty="0"/>
-              <a:t>we</a:t>
-            </a:r>
-            <a:r>
-              <a:rPr lang="zh-CN" altLang="en-US" dirty="0"/>
-              <a:t> </a:t>
-            </a:r>
-            <a:r>
-              <a:rPr lang="en-US" altLang="zh-CN" dirty="0"/>
-              <a:t>will</a:t>
-            </a:r>
-            <a:r>
-              <a:rPr lang="zh-CN" altLang="en-US" dirty="0"/>
-              <a:t> </a:t>
-            </a:r>
-            <a:r>
-              <a:rPr lang="en-US" altLang="zh-CN" dirty="0"/>
-              <a:t>ask</a:t>
-            </a:r>
-            <a:r>
-              <a:rPr lang="zh-CN" altLang="en-US" dirty="0"/>
-              <a:t> </a:t>
-            </a:r>
-            <a:r>
-              <a:rPr lang="en-US" altLang="zh-CN" dirty="0"/>
-              <a:t>if</a:t>
-            </a:r>
-            <a:r>
-              <a:rPr lang="zh-CN" altLang="en-US" dirty="0"/>
-              <a:t> </a:t>
-            </a:r>
-            <a:r>
-              <a:rPr lang="en-US" altLang="zh-CN" dirty="0"/>
-              <a:t>you</a:t>
-            </a:r>
-            <a:r>
-              <a:rPr lang="zh-CN" altLang="en-US" dirty="0"/>
-              <a:t> </a:t>
-            </a:r>
-            <a:r>
-              <a:rPr lang="en-US" altLang="zh-CN" dirty="0"/>
-              <a:t>think</a:t>
-            </a:r>
-            <a:r>
-              <a:rPr lang="zh-CN" altLang="en-US" dirty="0"/>
-              <a:t> </a:t>
-            </a:r>
-            <a:r>
-              <a:rPr lang="en-US" altLang="zh-CN" dirty="0"/>
-              <a:t>the</a:t>
-            </a:r>
-            <a:r>
-              <a:rPr lang="zh-CN" altLang="en-US" dirty="0"/>
-              <a:t> </a:t>
-            </a:r>
-            <a:r>
-              <a:rPr lang="en-US" altLang="zh-CN" dirty="0"/>
-              <a:t>winning</a:t>
-            </a:r>
-            <a:r>
-              <a:rPr lang="zh-CN" altLang="en-US" dirty="0"/>
-              <a:t> </a:t>
-            </a:r>
-            <a:r>
-              <a:rPr lang="en-US" altLang="zh-CN" dirty="0"/>
-              <a:t>card</a:t>
-            </a:r>
-            <a:r>
-              <a:rPr lang="zh-CN" altLang="en-US" dirty="0"/>
-              <a:t> </a:t>
-            </a:r>
-            <a:r>
-              <a:rPr lang="en-US" altLang="zh-CN" dirty="0"/>
-              <a:t>switched</a:t>
-            </a:r>
-            <a:r>
-              <a:rPr lang="zh-CN" altLang="en-US" dirty="0"/>
-              <a:t> </a:t>
-            </a:r>
-            <a:r>
-              <a:rPr lang="en-US" altLang="zh-CN" dirty="0"/>
-              <a:t>in</a:t>
-            </a:r>
-            <a:r>
-              <a:rPr lang="zh-CN" altLang="en-US" dirty="0"/>
-              <a:t> </a:t>
-            </a:r>
-            <a:r>
-              <a:rPr lang="en-US" altLang="zh-CN" dirty="0"/>
-              <a:t>the</a:t>
-            </a:r>
-            <a:r>
-              <a:rPr lang="zh-CN" altLang="en-US" dirty="0"/>
-              <a:t> </a:t>
-            </a:r>
-            <a:r>
-              <a:rPr lang="en-US" altLang="zh-CN" dirty="0"/>
-              <a:t>past</a:t>
-            </a:r>
-            <a:r>
-              <a:rPr lang="zh-CN" altLang="en-US" dirty="0"/>
-              <a:t> </a:t>
-            </a:r>
-            <a:r>
-              <a:rPr lang="en-US" altLang="zh-CN" dirty="0"/>
-              <a:t>few</a:t>
-            </a:r>
-            <a:r>
-              <a:rPr lang="zh-CN" altLang="en-US" dirty="0"/>
-              <a:t> </a:t>
-            </a:r>
-            <a:r>
-              <a:rPr lang="en-US" altLang="zh-CN" dirty="0"/>
-              <a:t>turns.</a:t>
-            </a:r>
-            <a:r>
-              <a:rPr lang="zh-CN" altLang="en-US" dirty="0"/>
-              <a:t> </a:t>
-            </a:r>
-            <a:r>
-              <a:rPr lang="en-US" altLang="zh-CN" dirty="0"/>
-              <a:t>That</a:t>
-            </a:r>
-            <a:r>
-              <a:rPr lang="zh-CN" altLang="en-US" dirty="0"/>
-              <a:t> </a:t>
-            </a:r>
-            <a:r>
-              <a:rPr lang="en-US" altLang="zh-CN" dirty="0"/>
-              <a:t>is,</a:t>
-            </a:r>
-            <a:r>
-              <a:rPr lang="zh-CN" altLang="en-US" dirty="0"/>
-              <a:t> </a:t>
-            </a:r>
-            <a:r>
-              <a:rPr lang="en-US" altLang="zh-CN" dirty="0"/>
-              <a:t>the</a:t>
-            </a:r>
-            <a:r>
-              <a:rPr lang="zh-CN" altLang="en-US" dirty="0"/>
-              <a:t> </a:t>
-            </a:r>
-            <a:r>
-              <a:rPr lang="en-US" altLang="zh-CN" dirty="0"/>
-              <a:t>color</a:t>
-            </a:r>
-            <a:r>
-              <a:rPr lang="zh-CN" altLang="en-US" dirty="0"/>
-              <a:t> </a:t>
-            </a:r>
-            <a:r>
-              <a:rPr lang="en-US" altLang="zh-CN" dirty="0"/>
-              <a:t>that</a:t>
-            </a:r>
-            <a:r>
-              <a:rPr lang="zh-CN" altLang="en-US" dirty="0"/>
-              <a:t> </a:t>
-            </a:r>
-            <a:r>
-              <a:rPr lang="en-US" altLang="zh-CN" dirty="0"/>
-              <a:t>gives</a:t>
-            </a:r>
-            <a:r>
-              <a:rPr lang="zh-CN" altLang="en-US" dirty="0"/>
-              <a:t> </a:t>
-            </a:r>
-            <a:r>
-              <a:rPr lang="en-US" altLang="zh-CN" dirty="0"/>
-              <a:t>you</a:t>
-            </a:r>
-            <a:r>
-              <a:rPr lang="zh-CN" altLang="en-US" dirty="0"/>
-              <a:t> </a:t>
-            </a:r>
-            <a:r>
-              <a:rPr lang="en-US" altLang="zh-CN" dirty="0"/>
-              <a:t>more</a:t>
-            </a:r>
-            <a:r>
-              <a:rPr lang="zh-CN" altLang="en-US" dirty="0"/>
-              <a:t> </a:t>
-            </a:r>
-            <a:r>
-              <a:rPr lang="en-US" altLang="zh-CN" dirty="0"/>
-              <a:t>stars</a:t>
-            </a:r>
-            <a:r>
-              <a:rPr lang="zh-CN" altLang="en-US" dirty="0"/>
-              <a:t> </a:t>
-            </a:r>
-            <a:r>
-              <a:rPr lang="en-US" altLang="zh-CN" dirty="0"/>
-              <a:t>is</a:t>
-            </a:r>
-            <a:r>
-              <a:rPr lang="zh-CN" altLang="en-US" dirty="0"/>
-              <a:t> </a:t>
-            </a:r>
-            <a:r>
-              <a:rPr lang="en-US" altLang="zh-CN" dirty="0"/>
-              <a:t>different</a:t>
-            </a:r>
-            <a:r>
-              <a:rPr lang="zh-CN" altLang="en-US" dirty="0"/>
-              <a:t> </a:t>
-            </a:r>
-            <a:r>
-              <a:rPr lang="en-US" altLang="zh-CN" dirty="0"/>
-              <a:t>from</a:t>
-            </a:r>
-            <a:r>
-              <a:rPr lang="zh-CN" altLang="en-US" dirty="0"/>
-              <a:t> </a:t>
-            </a:r>
-            <a:r>
-              <a:rPr lang="en-US" altLang="zh-CN" dirty="0"/>
-              <a:t>before.</a:t>
-            </a:r>
-          </a:p>
-          <a:p>
-            <a:endParaRPr lang="en-US" altLang="zh-CN" dirty="0"/>
-          </a:p>
-          <a:p>
-            <a:r>
-              <a:rPr lang="en-US" altLang="zh-CN" dirty="0"/>
-              <a:t>As</a:t>
-            </a:r>
-            <a:r>
-              <a:rPr lang="zh-CN" altLang="en-US" dirty="0"/>
-              <a:t> </a:t>
-            </a:r>
-            <a:r>
-              <a:rPr lang="en-US" altLang="zh-CN" dirty="0"/>
-              <a:t>you</a:t>
-            </a:r>
-            <a:r>
-              <a:rPr lang="zh-CN" altLang="en-US" dirty="0"/>
-              <a:t> </a:t>
-            </a:r>
-            <a:r>
-              <a:rPr lang="en-US" altLang="zh-CN" dirty="0"/>
-              <a:t>may</a:t>
-            </a:r>
-            <a:r>
-              <a:rPr lang="zh-CN" altLang="en-US" dirty="0"/>
-              <a:t> </a:t>
-            </a:r>
-            <a:r>
-              <a:rPr lang="en-US" altLang="zh-CN" dirty="0"/>
-              <a:t>noticed,</a:t>
-            </a:r>
-            <a:r>
-              <a:rPr lang="zh-CN" altLang="en-US" dirty="0"/>
-              <a:t> </a:t>
-            </a:r>
-            <a:r>
-              <a:rPr lang="en-US" altLang="zh-CN" dirty="0"/>
-              <a:t>the</a:t>
-            </a:r>
-            <a:r>
-              <a:rPr lang="zh-CN" altLang="en-US" dirty="0"/>
-              <a:t> </a:t>
-            </a:r>
-            <a:r>
-              <a:rPr lang="en-US" altLang="zh-CN" dirty="0"/>
-              <a:t>same</a:t>
-            </a:r>
-            <a:r>
-              <a:rPr lang="zh-CN" altLang="en-US" dirty="0"/>
-              <a:t> </a:t>
-            </a:r>
-            <a:r>
-              <a:rPr lang="en-US" altLang="zh-CN" dirty="0"/>
-              <a:t>color</a:t>
-            </a:r>
-            <a:r>
-              <a:rPr lang="zh-CN" altLang="en-US" dirty="0"/>
-              <a:t> </a:t>
-            </a:r>
-            <a:r>
-              <a:rPr lang="en-US" altLang="zh-CN" dirty="0"/>
-              <a:t>card</a:t>
-            </a:r>
-            <a:r>
-              <a:rPr lang="zh-CN" altLang="en-US" dirty="0"/>
-              <a:t> </a:t>
-            </a:r>
-            <a:r>
-              <a:rPr lang="en-US" altLang="zh-CN" dirty="0"/>
-              <a:t>is</a:t>
-            </a:r>
-            <a:r>
-              <a:rPr lang="zh-CN" altLang="en-US" dirty="0"/>
-              <a:t> </a:t>
-            </a:r>
-            <a:r>
-              <a:rPr lang="en-US" altLang="zh-CN" dirty="0"/>
-              <a:t>sometimes</a:t>
-            </a:r>
-            <a:r>
-              <a:rPr lang="zh-CN" altLang="en-US" dirty="0"/>
-              <a:t> </a:t>
-            </a:r>
-            <a:r>
-              <a:rPr lang="en-US" altLang="zh-CN" dirty="0"/>
-              <a:t>on</a:t>
-            </a:r>
-            <a:r>
-              <a:rPr lang="zh-CN" altLang="en-US" dirty="0"/>
-              <a:t> </a:t>
-            </a:r>
-            <a:r>
-              <a:rPr lang="en-US" altLang="zh-CN" dirty="0"/>
-              <a:t>the</a:t>
-            </a:r>
-            <a:r>
-              <a:rPr lang="zh-CN" altLang="en-US" dirty="0"/>
-              <a:t> </a:t>
-            </a:r>
-            <a:r>
-              <a:rPr lang="en-US" altLang="zh-CN" dirty="0"/>
-              <a:t>left,</a:t>
-            </a:r>
-            <a:r>
-              <a:rPr lang="zh-CN" altLang="en-US" dirty="0"/>
-              <a:t> </a:t>
-            </a:r>
-            <a:r>
-              <a:rPr lang="en-US" altLang="zh-CN" dirty="0"/>
-              <a:t>and</a:t>
-            </a:r>
-            <a:r>
-              <a:rPr lang="zh-CN" altLang="en-US" dirty="0"/>
-              <a:t> </a:t>
-            </a:r>
-            <a:r>
-              <a:rPr lang="en-US" altLang="zh-CN" dirty="0"/>
-              <a:t>sometimes</a:t>
-            </a:r>
-            <a:r>
-              <a:rPr lang="zh-CN" altLang="en-US" dirty="0"/>
-              <a:t> </a:t>
-            </a:r>
-            <a:r>
-              <a:rPr lang="en-US" altLang="zh-CN" dirty="0"/>
-              <a:t>on</a:t>
-            </a:r>
-            <a:r>
-              <a:rPr lang="zh-CN" altLang="en-US" dirty="0"/>
-              <a:t> </a:t>
-            </a:r>
-            <a:r>
-              <a:rPr lang="en-US" altLang="zh-CN" dirty="0"/>
-              <a:t>the</a:t>
-            </a:r>
-            <a:r>
-              <a:rPr lang="zh-CN" altLang="en-US" dirty="0"/>
-              <a:t> </a:t>
-            </a:r>
-            <a:r>
-              <a:rPr lang="en-US" altLang="zh-CN" dirty="0"/>
-              <a:t>right.</a:t>
-            </a:r>
-            <a:r>
-              <a:rPr lang="zh-CN" altLang="en-US" dirty="0"/>
-              <a:t> </a:t>
-            </a:r>
-            <a:r>
-              <a:rPr lang="en-US" altLang="zh-CN" dirty="0"/>
-              <a:t>Here</a:t>
-            </a:r>
-            <a:r>
-              <a:rPr lang="zh-CN" altLang="en-US" dirty="0"/>
-              <a:t> </a:t>
-            </a:r>
-            <a:r>
-              <a:rPr lang="en-US" altLang="zh-CN" dirty="0"/>
-              <a:t>we</a:t>
-            </a:r>
-            <a:r>
-              <a:rPr lang="zh-CN" altLang="en-US" dirty="0"/>
-              <a:t> </a:t>
-            </a:r>
-            <a:r>
-              <a:rPr lang="en-US" altLang="zh-CN" dirty="0"/>
-              <a:t>are</a:t>
-            </a:r>
-            <a:r>
-              <a:rPr lang="zh-CN" altLang="en-US" dirty="0"/>
-              <a:t> </a:t>
-            </a:r>
-            <a:r>
-              <a:rPr lang="en-US" altLang="zh-CN" dirty="0"/>
-              <a:t>asking</a:t>
-            </a:r>
-            <a:r>
-              <a:rPr lang="zh-CN" altLang="en-US" dirty="0"/>
-              <a:t> </a:t>
-            </a:r>
-            <a:r>
-              <a:rPr lang="en-US" altLang="zh-CN" dirty="0"/>
-              <a:t>about</a:t>
-            </a:r>
-            <a:r>
-              <a:rPr lang="zh-CN" altLang="en-US" dirty="0"/>
-              <a:t> </a:t>
-            </a:r>
-            <a:r>
-              <a:rPr lang="en-US" altLang="zh-CN" dirty="0"/>
-              <a:t>the</a:t>
-            </a:r>
-            <a:r>
-              <a:rPr lang="zh-CN" altLang="en-US" dirty="0"/>
-              <a:t> </a:t>
-            </a:r>
-            <a:r>
-              <a:rPr lang="en-US" altLang="zh-CN" dirty="0"/>
-              <a:t>color,</a:t>
-            </a:r>
-            <a:r>
-              <a:rPr lang="zh-CN" altLang="en-US" dirty="0"/>
-              <a:t> </a:t>
-            </a:r>
-            <a:r>
-              <a:rPr lang="en-US" altLang="zh-CN" dirty="0"/>
-              <a:t>not</a:t>
-            </a:r>
-            <a:r>
-              <a:rPr lang="zh-CN" altLang="en-US" dirty="0"/>
-              <a:t> </a:t>
-            </a:r>
-            <a:r>
-              <a:rPr lang="en-US" altLang="zh-CN" dirty="0"/>
-              <a:t>the</a:t>
-            </a:r>
-            <a:r>
-              <a:rPr lang="zh-CN" altLang="en-US" dirty="0"/>
-              <a:t> </a:t>
-            </a:r>
-            <a:r>
-              <a:rPr lang="en-US" altLang="zh-CN" dirty="0"/>
-              <a:t>position.</a:t>
-            </a:r>
-            <a:r>
-              <a:rPr lang="zh-CN" altLang="en-US" dirty="0"/>
-              <a:t> </a:t>
-            </a:r>
-            <a:endParaRPr lang="en-US" altLang="zh-CN" dirty="0"/>
-          </a:p>
-          <a:p>
-            <a:endParaRPr lang="en-US" altLang="zh-CN" dirty="0"/>
-          </a:p>
-          <a:p>
-            <a:r>
-              <a:rPr lang="en-US" altLang="zh-CN" dirty="0"/>
-              <a:t>[click</a:t>
-            </a:r>
-            <a:r>
-              <a:rPr lang="zh-CN" altLang="en-US" dirty="0"/>
-              <a:t> </a:t>
-            </a:r>
-            <a:r>
-              <a:rPr lang="en-US" altLang="zh-CN" dirty="0"/>
-              <a:t>for</a:t>
-            </a:r>
-            <a:r>
-              <a:rPr lang="zh-CN" altLang="en-US" dirty="0"/>
-              <a:t> </a:t>
-            </a:r>
-            <a:r>
-              <a:rPr lang="en-US" altLang="zh-CN" dirty="0"/>
-              <a:t>effect]</a:t>
-            </a:r>
-          </a:p>
-          <a:p>
-            <a:r>
-              <a:rPr lang="en-US" altLang="zh-CN" dirty="0"/>
-              <a:t>we</a:t>
-            </a:r>
-            <a:r>
-              <a:rPr lang="zh-CN" altLang="en-US" dirty="0"/>
-              <a:t> </a:t>
-            </a:r>
-            <a:r>
-              <a:rPr lang="en-US" altLang="zh-CN" dirty="0"/>
-              <a:t>will</a:t>
-            </a:r>
-            <a:r>
-              <a:rPr lang="zh-CN" altLang="en-US" dirty="0"/>
-              <a:t> </a:t>
-            </a:r>
-            <a:r>
-              <a:rPr lang="en-US" altLang="zh-CN" dirty="0"/>
-              <a:t>also</a:t>
-            </a:r>
-            <a:r>
-              <a:rPr lang="zh-CN" altLang="en-US" dirty="0"/>
-              <a:t> </a:t>
-            </a:r>
-            <a:r>
-              <a:rPr lang="en-US" altLang="zh-CN" dirty="0"/>
-              <a:t>highlight</a:t>
-            </a:r>
-            <a:r>
-              <a:rPr lang="zh-CN" altLang="en-US" dirty="0"/>
-              <a:t> </a:t>
-            </a:r>
-            <a:r>
-              <a:rPr lang="en-US" altLang="zh-CN" dirty="0"/>
-              <a:t>the</a:t>
-            </a:r>
-            <a:r>
-              <a:rPr lang="zh-CN" altLang="en-US" dirty="0"/>
-              <a:t> </a:t>
-            </a:r>
-            <a:r>
-              <a:rPr lang="en-US" altLang="zh-CN" dirty="0"/>
-              <a:t>card</a:t>
-            </a:r>
-            <a:r>
-              <a:rPr lang="zh-CN" altLang="en-US" dirty="0"/>
-              <a:t> </a:t>
-            </a:r>
-            <a:r>
-              <a:rPr lang="en-US" altLang="zh-CN" dirty="0"/>
-              <a:t>that</a:t>
-            </a:r>
-            <a:r>
-              <a:rPr lang="zh-CN" altLang="en-US" dirty="0"/>
-              <a:t> </a:t>
-            </a:r>
-            <a:r>
-              <a:rPr lang="en-US" altLang="zh-CN" dirty="0"/>
-              <a:t>you</a:t>
-            </a:r>
-            <a:r>
-              <a:rPr lang="zh-CN" altLang="en-US" dirty="0"/>
-              <a:t> </a:t>
-            </a:r>
-            <a:r>
-              <a:rPr lang="en-US" altLang="zh-CN" dirty="0"/>
-              <a:t>chose</a:t>
-            </a:r>
-            <a:r>
-              <a:rPr lang="zh-CN" altLang="en-US" dirty="0"/>
-              <a:t> </a:t>
-            </a:r>
-            <a:r>
-              <a:rPr lang="en-US" altLang="zh-CN" dirty="0"/>
-              <a:t>before</a:t>
-            </a:r>
-            <a:r>
-              <a:rPr lang="zh-CN" altLang="en-US" dirty="0"/>
-              <a:t> </a:t>
-            </a:r>
-            <a:r>
-              <a:rPr lang="en-US" altLang="zh-CN" dirty="0"/>
-              <a:t>in</a:t>
-            </a:r>
-            <a:r>
-              <a:rPr lang="zh-CN" altLang="en-US" dirty="0"/>
-              <a:t> </a:t>
-            </a:r>
-            <a:r>
-              <a:rPr lang="en-US" altLang="zh-CN" dirty="0"/>
-              <a:t>case</a:t>
-            </a:r>
-            <a:r>
-              <a:rPr lang="zh-CN" altLang="en-US" dirty="0"/>
-              <a:t> </a:t>
-            </a:r>
-            <a:r>
-              <a:rPr lang="en-US" altLang="zh-CN" dirty="0"/>
-              <a:t>you</a:t>
-            </a:r>
-            <a:r>
-              <a:rPr lang="zh-CN" altLang="en-US" dirty="0"/>
-              <a:t> </a:t>
-            </a:r>
-            <a:r>
-              <a:rPr lang="en-US" altLang="zh-CN" dirty="0"/>
-              <a:t>don’t</a:t>
-            </a:r>
-            <a:r>
-              <a:rPr lang="zh-CN" altLang="en-US" dirty="0"/>
-              <a:t> </a:t>
-            </a:r>
-            <a:r>
-              <a:rPr lang="en-US" altLang="zh-CN" dirty="0"/>
-              <a:t>remember.</a:t>
-            </a:r>
-          </a:p>
-        </p:txBody>
-      </p:sp>
-      <p:sp>
-        <p:nvSpPr>
-          <p:cNvPr id="4" name="Slide Number Placeholder 3">
-            <a:extLst>
-              <a:ext uri="{FF2B5EF4-FFF2-40B4-BE49-F238E27FC236}">
-                <a16:creationId xmlns:a16="http://schemas.microsoft.com/office/drawing/2014/main" id="{44E0F7A8-94F1-F38D-E8BE-38A2B2BBA204}"/>
-              </a:ext>
-            </a:extLst>
-          </p:cNvPr>
-          <p:cNvSpPr>
-            <a:spLocks noGrp="1"/>
-          </p:cNvSpPr>
-          <p:nvPr>
-            <p:ph type="sldNum" sz="quarter" idx="5"/>
-          </p:nvPr>
-        </p:nvSpPr>
-        <p:spPr/>
-        <p:txBody>
-          <a:bodyPr/>
-          <a:lstStyle/>
-          <a:p>
-            <a:fld id="{5807BC3C-6967-BF40-A292-C94745E4376C}" type="slidenum">
-              <a:rPr lang="en-US" smtClean="0"/>
-              <a:t>2</a:t>
-            </a:fld>
-            <a:endParaRPr lang="en-US"/>
-          </a:p>
-        </p:txBody>
-      </p:sp>
-    </p:spTree>
-    <p:extLst>
-      <p:ext uri="{BB962C8B-B14F-4D97-AF65-F5344CB8AC3E}">
-        <p14:creationId xmlns:p14="http://schemas.microsoft.com/office/powerpoint/2010/main" val="24299957"/>
-      </p:ext>
-    </p:extLst>
-  </p:cSld>
-  <p:clrMapOvr>
-    <a:masterClrMapping/>
-  </p:clrMapOvr>
-</p:notes>
-</file>
-
-<file path=ppt/notesSlides/notesSlide3.xml><?xml version="1.0" encoding="utf-8"?>
-<p:notes xmlns:a="http://schemas.openxmlformats.org/drawingml/2006/main" xmlns:r="http://schemas.openxmlformats.org/officeDocument/2006/relationships" xmlns:p="http://schemas.openxmlformats.org/presentationml/2006/main">
-  <p:cSld>
-    <p:spTree>
-      <p:nvGrpSpPr>
         <p:cNvPr id="1" name=""/>
         <p:cNvGrpSpPr/>
         <p:nvPr/>
@@ -2073,7 +1364,7 @@
             </a:r>
             <a:r>
               <a:rPr lang="en-US" altLang="zh-CN" dirty="0"/>
-              <a:t>third</a:t>
+              <a:t>second</a:t>
             </a:r>
             <a:r>
               <a:rPr lang="zh-CN" altLang="en-US" dirty="0"/>
@@ -2585,7 +1876,7 @@
           <a:p>
             <a:fld id="{163F1028-65D3-1A45-9B38-3C7C20421446}" type="slidenum">
               <a:rPr lang="en-US" smtClean="0"/>
-              <a:t>3</a:t>
+              <a:t>2</a:t>
             </a:fld>
             <a:endParaRPr lang="en-US"/>
           </a:p>
@@ -2604,7 +1895,7 @@
 </p:notes>
 </file>
 
-<file path=ppt/notesSlides/notesSlide4.xml><?xml version="1.0" encoding="utf-8"?>
+<file path=ppt/notesSlides/notesSlide3.xml><?xml version="1.0" encoding="utf-8"?>
 <p:notes xmlns:a="http://schemas.openxmlformats.org/drawingml/2006/main" xmlns:r="http://schemas.openxmlformats.org/officeDocument/2006/relationships" xmlns:p="http://schemas.openxmlformats.org/presentationml/2006/main">
   <p:cSld>
     <p:spTree>
@@ -2878,7 +2169,7 @@
           <a:p>
             <a:fld id="{163F1028-65D3-1A45-9B38-3C7C20421446}" type="slidenum">
               <a:rPr lang="en-US" smtClean="0"/>
-              <a:t>4</a:t>
+              <a:t>3</a:t>
             </a:fld>
             <a:endParaRPr lang="en-US"/>
           </a:p>
@@ -6725,986 +6016,6 @@
 </file>
 
 <file path=ppt/slides/slide2.xml><?xml version="1.0" encoding="utf-8"?>
-<p:sld xmlns:a="http://schemas.openxmlformats.org/drawingml/2006/main" xmlns:r="http://schemas.openxmlformats.org/officeDocument/2006/relationships" xmlns:p="http://schemas.openxmlformats.org/presentationml/2006/main">
-  <p:cSld>
-    <p:spTree>
-      <p:nvGrpSpPr>
-        <p:cNvPr id="1" name="">
-          <a:extLst>
-            <a:ext uri="{FF2B5EF4-FFF2-40B4-BE49-F238E27FC236}">
-              <a16:creationId xmlns:a16="http://schemas.microsoft.com/office/drawing/2014/main" id="{E9A2F937-BB75-CDF3-660A-FA5EA3211C95}"/>
-            </a:ext>
-          </a:extLst>
-        </p:cNvPr>
-        <p:cNvGrpSpPr/>
-        <p:nvPr/>
-      </p:nvGrpSpPr>
-      <p:grpSpPr>
-        <a:xfrm>
-          <a:off x="0" y="0"/>
-          <a:ext cx="0" cy="0"/>
-          <a:chOff x="0" y="0"/>
-          <a:chExt cx="0" cy="0"/>
-        </a:xfrm>
-      </p:grpSpPr>
-      <p:sp>
-        <p:nvSpPr>
-          <p:cNvPr id="2" name="TextBox 1">
-            <a:extLst>
-              <a:ext uri="{FF2B5EF4-FFF2-40B4-BE49-F238E27FC236}">
-                <a16:creationId xmlns:a16="http://schemas.microsoft.com/office/drawing/2014/main" id="{A7C0B157-A3AA-A57C-CC1E-DBA3F0185700}"/>
-              </a:ext>
-            </a:extLst>
-          </p:cNvPr>
-          <p:cNvSpPr txBox="1"/>
-          <p:nvPr/>
-        </p:nvSpPr>
-        <p:spPr>
-          <a:xfrm>
-            <a:off x="1495348" y="1075323"/>
-            <a:ext cx="9700195" cy="369332"/>
-          </a:xfrm>
-          <a:prstGeom prst="rect">
-            <a:avLst/>
-          </a:prstGeom>
-          <a:noFill/>
-        </p:spPr>
-        <p:txBody>
-          <a:bodyPr wrap="square" rtlCol="0">
-            <a:spAutoFit/>
-          </a:bodyPr>
-          <a:lstStyle/>
-          <a:p>
-            <a:pPr algn="ctr"/>
-            <a:r>
-              <a:rPr lang="en-US" b="0" i="0" dirty="0">
-                <a:solidFill>
-                  <a:srgbClr val="000000"/>
-                </a:solidFill>
-                <a:effectLst/>
-                <a:latin typeface="Open Sans" panose="020B0606030504020204" pitchFamily="34" charset="0"/>
-              </a:rPr>
-              <a:t>Last time you said </a:t>
-            </a:r>
-            <a:r>
-              <a:rPr lang="en-US" altLang="zh-CN" b="0" i="0" dirty="0">
-                <a:solidFill>
-                  <a:srgbClr val="000000"/>
-                </a:solidFill>
-                <a:effectLst/>
-                <a:latin typeface="Open Sans" panose="020B0606030504020204" pitchFamily="34" charset="0"/>
-              </a:rPr>
-              <a:t>this</a:t>
-            </a:r>
-            <a:r>
-              <a:rPr lang="en-US" b="0" i="0" dirty="0">
-                <a:solidFill>
-                  <a:srgbClr val="000000"/>
-                </a:solidFill>
-                <a:effectLst/>
-                <a:latin typeface="Open Sans" panose="020B0606030504020204" pitchFamily="34" charset="0"/>
-              </a:rPr>
-              <a:t> card </a:t>
-            </a:r>
-            <a:r>
-              <a:rPr lang="en-US" altLang="zh-CN" b="0" i="0" dirty="0">
-                <a:solidFill>
-                  <a:srgbClr val="000000"/>
-                </a:solidFill>
-                <a:effectLst/>
-                <a:latin typeface="Open Sans" panose="020B0606030504020204" pitchFamily="34" charset="0"/>
-              </a:rPr>
-              <a:t>wins.</a:t>
-            </a:r>
-            <a:r>
-              <a:rPr lang="zh-CN" altLang="en-US" b="0" i="0" dirty="0">
-                <a:solidFill>
-                  <a:srgbClr val="000000"/>
-                </a:solidFill>
-                <a:effectLst/>
-                <a:latin typeface="Open Sans" panose="020B0606030504020204" pitchFamily="34" charset="0"/>
-              </a:rPr>
-              <a:t> </a:t>
-            </a:r>
-            <a:r>
-              <a:rPr lang="en-US" altLang="zh-CN" b="0" i="0" dirty="0">
-                <a:solidFill>
-                  <a:srgbClr val="000000"/>
-                </a:solidFill>
-                <a:effectLst/>
-                <a:latin typeface="Open Sans" panose="020B0606030504020204" pitchFamily="34" charset="0"/>
-              </a:rPr>
-              <a:t>Did</a:t>
-            </a:r>
-            <a:r>
-              <a:rPr lang="zh-CN" altLang="en-US" b="0" i="0" dirty="0">
-                <a:solidFill>
-                  <a:srgbClr val="000000"/>
-                </a:solidFill>
-                <a:effectLst/>
-                <a:latin typeface="Open Sans" panose="020B0606030504020204" pitchFamily="34" charset="0"/>
-              </a:rPr>
-              <a:t> </a:t>
-            </a:r>
-            <a:r>
-              <a:rPr lang="en-US" altLang="zh-CN" b="0" i="0" dirty="0">
-                <a:solidFill>
-                  <a:srgbClr val="000000"/>
-                </a:solidFill>
-                <a:effectLst/>
-                <a:latin typeface="Open Sans" panose="020B0606030504020204" pitchFamily="34" charset="0"/>
-              </a:rPr>
-              <a:t>it</a:t>
-            </a:r>
-            <a:r>
-              <a:rPr lang="zh-CN" altLang="en-US" b="0" i="0" dirty="0">
-                <a:solidFill>
-                  <a:srgbClr val="000000"/>
-                </a:solidFill>
-                <a:effectLst/>
-                <a:latin typeface="Open Sans" panose="020B0606030504020204" pitchFamily="34" charset="0"/>
-              </a:rPr>
-              <a:t> </a:t>
-            </a:r>
-            <a:r>
-              <a:rPr lang="en-US" altLang="zh-CN" b="0" i="0" dirty="0">
-                <a:solidFill>
-                  <a:srgbClr val="000000"/>
-                </a:solidFill>
-                <a:effectLst/>
-                <a:latin typeface="Open Sans" panose="020B0606030504020204" pitchFamily="34" charset="0"/>
-              </a:rPr>
-              <a:t>switch</a:t>
-            </a:r>
-            <a:r>
-              <a:rPr lang="zh-CN" altLang="en-US" b="0" i="0" dirty="0">
-                <a:solidFill>
-                  <a:srgbClr val="000000"/>
-                </a:solidFill>
-                <a:effectLst/>
-                <a:latin typeface="Open Sans" panose="020B0606030504020204" pitchFamily="34" charset="0"/>
-              </a:rPr>
-              <a:t> </a:t>
-            </a:r>
-            <a:r>
-              <a:rPr lang="en-US" altLang="zh-CN" b="0" i="0" dirty="0">
-                <a:solidFill>
-                  <a:srgbClr val="000000"/>
-                </a:solidFill>
-                <a:effectLst/>
-                <a:latin typeface="Open Sans" panose="020B0606030504020204" pitchFamily="34" charset="0"/>
-              </a:rPr>
-              <a:t>in</a:t>
-            </a:r>
-            <a:r>
-              <a:rPr lang="zh-CN" altLang="en-US" b="0" i="0" dirty="0">
-                <a:solidFill>
-                  <a:srgbClr val="000000"/>
-                </a:solidFill>
-                <a:effectLst/>
-                <a:latin typeface="Open Sans" panose="020B0606030504020204" pitchFamily="34" charset="0"/>
-              </a:rPr>
-              <a:t> </a:t>
-            </a:r>
-            <a:r>
-              <a:rPr lang="en-US" altLang="zh-CN" b="0" i="0" dirty="0">
-                <a:solidFill>
-                  <a:srgbClr val="000000"/>
-                </a:solidFill>
-                <a:effectLst/>
-                <a:latin typeface="Open Sans" panose="020B0606030504020204" pitchFamily="34" charset="0"/>
-              </a:rPr>
-              <a:t>the</a:t>
-            </a:r>
-            <a:r>
-              <a:rPr lang="zh-CN" altLang="en-US" b="0" i="0" dirty="0">
-                <a:solidFill>
-                  <a:srgbClr val="000000"/>
-                </a:solidFill>
-                <a:effectLst/>
-                <a:latin typeface="Open Sans" panose="020B0606030504020204" pitchFamily="34" charset="0"/>
-              </a:rPr>
-              <a:t> </a:t>
-            </a:r>
-            <a:r>
-              <a:rPr lang="en-US" altLang="zh-CN" b="0" i="0" dirty="0">
-                <a:solidFill>
-                  <a:srgbClr val="000000"/>
-                </a:solidFill>
-                <a:effectLst/>
-                <a:latin typeface="Open Sans" panose="020B0606030504020204" pitchFamily="34" charset="0"/>
-              </a:rPr>
-              <a:t>past</a:t>
-            </a:r>
-            <a:r>
-              <a:rPr lang="zh-CN" altLang="en-US" b="0" i="0" dirty="0">
-                <a:solidFill>
-                  <a:srgbClr val="000000"/>
-                </a:solidFill>
-                <a:effectLst/>
-                <a:latin typeface="Open Sans" panose="020B0606030504020204" pitchFamily="34" charset="0"/>
-              </a:rPr>
-              <a:t> </a:t>
-            </a:r>
-            <a:r>
-              <a:rPr lang="en-US" altLang="zh-CN" b="0" i="0" dirty="0">
-                <a:solidFill>
-                  <a:srgbClr val="000000"/>
-                </a:solidFill>
-                <a:effectLst/>
-                <a:latin typeface="Open Sans" panose="020B0606030504020204" pitchFamily="34" charset="0"/>
-              </a:rPr>
-              <a:t>few</a:t>
-            </a:r>
-            <a:r>
-              <a:rPr lang="zh-CN" altLang="en-US" b="0" i="0" dirty="0">
-                <a:solidFill>
-                  <a:srgbClr val="000000"/>
-                </a:solidFill>
-                <a:effectLst/>
-                <a:latin typeface="Open Sans" panose="020B0606030504020204" pitchFamily="34" charset="0"/>
-              </a:rPr>
-              <a:t> </a:t>
-            </a:r>
-            <a:r>
-              <a:rPr lang="en-US" altLang="zh-CN" b="0" i="0" dirty="0">
-                <a:solidFill>
-                  <a:srgbClr val="000000"/>
-                </a:solidFill>
-                <a:effectLst/>
-                <a:latin typeface="Open Sans" panose="020B0606030504020204" pitchFamily="34" charset="0"/>
-              </a:rPr>
-              <a:t>turns?</a:t>
-            </a:r>
-            <a:r>
-              <a:rPr lang="en-US" b="0" i="0" dirty="0">
-                <a:solidFill>
-                  <a:srgbClr val="8B0000"/>
-                </a:solidFill>
-                <a:effectLst/>
-                <a:latin typeface="Open Sans" panose="020B0606030504020204" pitchFamily="34" charset="0"/>
-              </a:rPr>
-              <a:t>*</a:t>
-            </a:r>
-            <a:endParaRPr lang="en-US" b="0" i="0" dirty="0">
-              <a:solidFill>
-                <a:srgbClr val="000000"/>
-              </a:solidFill>
-              <a:effectLst/>
-              <a:latin typeface="Open Sans" panose="020B0606030504020204" pitchFamily="34" charset="0"/>
-            </a:endParaRPr>
-          </a:p>
-        </p:txBody>
-      </p:sp>
-      <p:sp>
-        <p:nvSpPr>
-          <p:cNvPr id="3" name="Rectangle 2">
-            <a:extLst>
-              <a:ext uri="{FF2B5EF4-FFF2-40B4-BE49-F238E27FC236}">
-                <a16:creationId xmlns:a16="http://schemas.microsoft.com/office/drawing/2014/main" id="{C4C3EBD3-34B6-75B1-0130-E239C7AE707A}"/>
-              </a:ext>
-            </a:extLst>
-          </p:cNvPr>
-          <p:cNvSpPr>
-            <a:spLocks noChangeAspect="1"/>
-          </p:cNvSpPr>
-          <p:nvPr/>
-        </p:nvSpPr>
-        <p:spPr>
-          <a:xfrm>
-            <a:off x="7276083" y="2011680"/>
-            <a:ext cx="2355063" cy="2834640"/>
-          </a:xfrm>
-          <a:prstGeom prst="rect">
-            <a:avLst/>
-          </a:prstGeom>
-        </p:spPr>
-        <p:style>
-          <a:lnRef idx="2">
-            <a:schemeClr val="accent6">
-              <a:shade val="50000"/>
-            </a:schemeClr>
-          </a:lnRef>
-          <a:fillRef idx="1">
-            <a:schemeClr val="accent6"/>
-          </a:fillRef>
-          <a:effectRef idx="0">
-            <a:schemeClr val="accent6"/>
-          </a:effectRef>
-          <a:fontRef idx="minor">
-            <a:schemeClr val="lt1"/>
-          </a:fontRef>
-        </p:style>
-        <p:txBody>
-          <a:bodyPr rtlCol="0" anchor="ctr"/>
-          <a:lstStyle/>
-          <a:p>
-            <a:pPr rtl="0">
-              <a:spcBef>
-                <a:spcPts val="0"/>
-              </a:spcBef>
-              <a:spcAft>
-                <a:spcPts val="0"/>
-              </a:spcAft>
-            </a:pPr>
-            <a:endParaRPr lang="en-US" sz="5400" b="0" dirty="0">
-              <a:effectLst/>
-            </a:endParaRPr>
-          </a:p>
-        </p:txBody>
-      </p:sp>
-      <p:sp>
-        <p:nvSpPr>
-          <p:cNvPr id="4" name="Rectangle 3">
-            <a:extLst>
-              <a:ext uri="{FF2B5EF4-FFF2-40B4-BE49-F238E27FC236}">
-                <a16:creationId xmlns:a16="http://schemas.microsoft.com/office/drawing/2014/main" id="{1D1F07C7-C166-85BB-4C44-6EB1331B15EA}"/>
-              </a:ext>
-            </a:extLst>
-          </p:cNvPr>
-          <p:cNvSpPr>
-            <a:spLocks noChangeAspect="1"/>
-          </p:cNvSpPr>
-          <p:nvPr/>
-        </p:nvSpPr>
-        <p:spPr>
-          <a:xfrm>
-            <a:off x="2309130" y="2011680"/>
-            <a:ext cx="2355063" cy="2834640"/>
-          </a:xfrm>
-          <a:prstGeom prst="rect">
-            <a:avLst/>
-          </a:prstGeom>
-        </p:spPr>
-        <p:style>
-          <a:lnRef idx="1">
-            <a:schemeClr val="accent1"/>
-          </a:lnRef>
-          <a:fillRef idx="3">
-            <a:schemeClr val="accent1"/>
-          </a:fillRef>
-          <a:effectRef idx="2">
-            <a:schemeClr val="accent1"/>
-          </a:effectRef>
-          <a:fontRef idx="minor">
-            <a:schemeClr val="lt1"/>
-          </a:fontRef>
-        </p:style>
-        <p:txBody>
-          <a:bodyPr rtlCol="0" anchor="ctr"/>
-          <a:lstStyle/>
-          <a:p>
-            <a:pPr algn="ctr"/>
-            <a:endParaRPr lang="en-US" dirty="0"/>
-          </a:p>
-        </p:txBody>
-      </p:sp>
-      <p:grpSp>
-        <p:nvGrpSpPr>
-          <p:cNvPr id="10" name="Group 9">
-            <a:extLst>
-              <a:ext uri="{FF2B5EF4-FFF2-40B4-BE49-F238E27FC236}">
-                <a16:creationId xmlns:a16="http://schemas.microsoft.com/office/drawing/2014/main" id="{D8914456-0298-92CC-8A81-2176FA9C0EBD}"/>
-              </a:ext>
-            </a:extLst>
-          </p:cNvPr>
-          <p:cNvGrpSpPr/>
-          <p:nvPr/>
-        </p:nvGrpSpPr>
-        <p:grpSpPr>
-          <a:xfrm>
-            <a:off x="3719488" y="5276529"/>
-            <a:ext cx="6725774" cy="750548"/>
-            <a:chOff x="4411145" y="5042069"/>
-            <a:chExt cx="6725774" cy="750548"/>
-          </a:xfrm>
-        </p:grpSpPr>
-        <p:sp>
-          <p:nvSpPr>
-            <p:cNvPr id="7" name="Oval 6">
-              <a:extLst>
-                <a:ext uri="{FF2B5EF4-FFF2-40B4-BE49-F238E27FC236}">
-                  <a16:creationId xmlns:a16="http://schemas.microsoft.com/office/drawing/2014/main" id="{7978E596-47C3-25F8-F173-E343AFF266A1}"/>
-                </a:ext>
-              </a:extLst>
-            </p:cNvPr>
-            <p:cNvSpPr/>
-            <p:nvPr/>
-          </p:nvSpPr>
-          <p:spPr>
-            <a:xfrm>
-              <a:off x="4411145" y="5134802"/>
-              <a:ext cx="176194" cy="185467"/>
-            </a:xfrm>
-            <a:prstGeom prst="ellipse">
-              <a:avLst/>
-            </a:prstGeom>
-            <a:noFill/>
-            <a:ln>
-              <a:solidFill>
-                <a:schemeClr val="tx1"/>
-              </a:solidFill>
-            </a:ln>
-          </p:spPr>
-          <p:style>
-            <a:lnRef idx="2">
-              <a:schemeClr val="accent1">
-                <a:shade val="15000"/>
-              </a:schemeClr>
-            </a:lnRef>
-            <a:fillRef idx="1">
-              <a:schemeClr val="accent1"/>
-            </a:fillRef>
-            <a:effectRef idx="0">
-              <a:schemeClr val="accent1"/>
-            </a:effectRef>
-            <a:fontRef idx="minor">
-              <a:schemeClr val="lt1"/>
-            </a:fontRef>
-          </p:style>
-          <p:txBody>
-            <a:bodyPr rtlCol="0" anchor="ctr"/>
-            <a:lstStyle/>
-            <a:p>
-              <a:pPr algn="ctr"/>
-              <a:endParaRPr lang="en-US"/>
-            </a:p>
-          </p:txBody>
-        </p:sp>
-        <p:sp>
-          <p:nvSpPr>
-            <p:cNvPr id="5" name="TextBox 4">
-              <a:extLst>
-                <a:ext uri="{FF2B5EF4-FFF2-40B4-BE49-F238E27FC236}">
-                  <a16:creationId xmlns:a16="http://schemas.microsoft.com/office/drawing/2014/main" id="{F72C0E6A-1016-6E26-3C65-0A8CDEEF2A99}"/>
-                </a:ext>
-              </a:extLst>
-            </p:cNvPr>
-            <p:cNvSpPr txBox="1"/>
-            <p:nvPr/>
-          </p:nvSpPr>
-          <p:spPr>
-            <a:xfrm>
-              <a:off x="4771291" y="5042069"/>
-              <a:ext cx="6365628" cy="369332"/>
-            </a:xfrm>
-            <a:prstGeom prst="rect">
-              <a:avLst/>
-            </a:prstGeom>
-            <a:noFill/>
-          </p:spPr>
-          <p:txBody>
-            <a:bodyPr wrap="square" rtlCol="0">
-              <a:spAutoFit/>
-            </a:bodyPr>
-            <a:lstStyle/>
-            <a:p>
-              <a:r>
-                <a:rPr lang="en-US" altLang="zh-CN" dirty="0"/>
-                <a:t>Yes.</a:t>
-              </a:r>
-              <a:r>
-                <a:rPr lang="zh-CN" altLang="en-US" dirty="0"/>
-                <a:t> </a:t>
-              </a:r>
-              <a:r>
-                <a:rPr lang="en-US" altLang="zh-CN" dirty="0"/>
-                <a:t>The</a:t>
-              </a:r>
-              <a:r>
-                <a:rPr lang="zh-CN" altLang="en-US" dirty="0"/>
-                <a:t> </a:t>
-              </a:r>
-              <a:r>
-                <a:rPr lang="en-US" altLang="zh-CN" dirty="0"/>
-                <a:t>winning</a:t>
-              </a:r>
-              <a:r>
-                <a:rPr lang="zh-CN" altLang="en-US" dirty="0"/>
-                <a:t> </a:t>
-              </a:r>
-              <a:r>
-                <a:rPr lang="en-US" altLang="zh-CN" dirty="0"/>
-                <a:t>card</a:t>
-              </a:r>
-              <a:r>
-                <a:rPr lang="zh-CN" altLang="en-US" dirty="0"/>
-                <a:t> </a:t>
-              </a:r>
-              <a:r>
-                <a:rPr lang="en-US" altLang="zh-CN" dirty="0"/>
-                <a:t>switched</a:t>
-              </a:r>
-              <a:r>
-                <a:rPr lang="zh-CN" altLang="en-US" dirty="0"/>
-                <a:t> </a:t>
-              </a:r>
-              <a:r>
-                <a:rPr lang="en-US" altLang="zh-CN" dirty="0"/>
-                <a:t>from</a:t>
-              </a:r>
-              <a:r>
-                <a:rPr lang="zh-CN" altLang="en-US" dirty="0"/>
-                <a:t> </a:t>
-              </a:r>
-              <a:r>
-                <a:rPr lang="en-US" altLang="zh-CN" dirty="0"/>
-                <a:t>one</a:t>
-              </a:r>
-              <a:r>
-                <a:rPr lang="zh-CN" altLang="en-US" dirty="0"/>
-                <a:t> </a:t>
-              </a:r>
-              <a:r>
-                <a:rPr lang="en-US" altLang="zh-CN" dirty="0"/>
-                <a:t>color</a:t>
-              </a:r>
-              <a:r>
-                <a:rPr lang="zh-CN" altLang="en-US" dirty="0"/>
-                <a:t> </a:t>
-              </a:r>
-              <a:r>
-                <a:rPr lang="en-US" altLang="zh-CN" dirty="0"/>
-                <a:t>to</a:t>
-              </a:r>
-              <a:r>
-                <a:rPr lang="zh-CN" altLang="en-US" dirty="0"/>
-                <a:t> </a:t>
-              </a:r>
-              <a:r>
-                <a:rPr lang="en-US" altLang="zh-CN" dirty="0"/>
-                <a:t>the</a:t>
-              </a:r>
-              <a:r>
-                <a:rPr lang="zh-CN" altLang="en-US" dirty="0"/>
-                <a:t> </a:t>
-              </a:r>
-              <a:r>
-                <a:rPr lang="en-US" altLang="zh-CN" dirty="0"/>
-                <a:t>other.</a:t>
-              </a:r>
-              <a:endParaRPr lang="en-US" dirty="0"/>
-            </a:p>
-          </p:txBody>
-        </p:sp>
-        <p:sp>
-          <p:nvSpPr>
-            <p:cNvPr id="6" name="Oval 5">
-              <a:extLst>
-                <a:ext uri="{FF2B5EF4-FFF2-40B4-BE49-F238E27FC236}">
-                  <a16:creationId xmlns:a16="http://schemas.microsoft.com/office/drawing/2014/main" id="{15442450-DAA0-DC8D-7426-B9CA46B4D062}"/>
-                </a:ext>
-              </a:extLst>
-            </p:cNvPr>
-            <p:cNvSpPr/>
-            <p:nvPr/>
-          </p:nvSpPr>
-          <p:spPr>
-            <a:xfrm>
-              <a:off x="4411145" y="5516017"/>
-              <a:ext cx="176194" cy="185467"/>
-            </a:xfrm>
-            <a:prstGeom prst="ellipse">
-              <a:avLst/>
-            </a:prstGeom>
-            <a:noFill/>
-            <a:ln>
-              <a:solidFill>
-                <a:schemeClr val="tx1"/>
-              </a:solidFill>
-            </a:ln>
-          </p:spPr>
-          <p:style>
-            <a:lnRef idx="2">
-              <a:schemeClr val="accent1">
-                <a:shade val="15000"/>
-              </a:schemeClr>
-            </a:lnRef>
-            <a:fillRef idx="1">
-              <a:schemeClr val="accent1"/>
-            </a:fillRef>
-            <a:effectRef idx="0">
-              <a:schemeClr val="accent1"/>
-            </a:effectRef>
-            <a:fontRef idx="minor">
-              <a:schemeClr val="lt1"/>
-            </a:fontRef>
-          </p:style>
-          <p:txBody>
-            <a:bodyPr rtlCol="0" anchor="ctr"/>
-            <a:lstStyle/>
-            <a:p>
-              <a:pPr algn="ctr"/>
-              <a:endParaRPr lang="en-US"/>
-            </a:p>
-          </p:txBody>
-        </p:sp>
-        <p:sp>
-          <p:nvSpPr>
-            <p:cNvPr id="9" name="TextBox 8">
-              <a:extLst>
-                <a:ext uri="{FF2B5EF4-FFF2-40B4-BE49-F238E27FC236}">
-                  <a16:creationId xmlns:a16="http://schemas.microsoft.com/office/drawing/2014/main" id="{7C22B9D9-81DF-5F59-0838-862C248D9389}"/>
-                </a:ext>
-              </a:extLst>
-            </p:cNvPr>
-            <p:cNvSpPr txBox="1"/>
-            <p:nvPr/>
-          </p:nvSpPr>
-          <p:spPr>
-            <a:xfrm>
-              <a:off x="4771291" y="5423285"/>
-              <a:ext cx="4642340" cy="369332"/>
-            </a:xfrm>
-            <a:prstGeom prst="rect">
-              <a:avLst/>
-            </a:prstGeom>
-            <a:noFill/>
-          </p:spPr>
-          <p:txBody>
-            <a:bodyPr wrap="square" rtlCol="0">
-              <a:spAutoFit/>
-            </a:bodyPr>
-            <a:lstStyle/>
-            <a:p>
-              <a:r>
-                <a:rPr lang="en-US" altLang="zh-CN" dirty="0"/>
-                <a:t>No.</a:t>
-              </a:r>
-              <a:r>
-                <a:rPr lang="zh-CN" altLang="en-US" dirty="0"/>
-                <a:t> </a:t>
-              </a:r>
-              <a:r>
-                <a:rPr lang="en-US" altLang="zh-CN" dirty="0"/>
-                <a:t>The</a:t>
-              </a:r>
-              <a:r>
-                <a:rPr lang="zh-CN" altLang="en-US" dirty="0"/>
-                <a:t> </a:t>
-              </a:r>
-              <a:r>
-                <a:rPr lang="en-US" altLang="zh-CN" dirty="0"/>
-                <a:t>winning</a:t>
-              </a:r>
-              <a:r>
-                <a:rPr lang="zh-CN" altLang="en-US" dirty="0"/>
-                <a:t> </a:t>
-              </a:r>
-              <a:r>
-                <a:rPr lang="en-US" altLang="zh-CN" dirty="0"/>
-                <a:t>card</a:t>
-              </a:r>
-              <a:r>
-                <a:rPr lang="zh-CN" altLang="en-US" dirty="0"/>
-                <a:t> </a:t>
-              </a:r>
-              <a:r>
-                <a:rPr lang="en-US" altLang="zh-CN" dirty="0"/>
-                <a:t>is</a:t>
-              </a:r>
-              <a:r>
-                <a:rPr lang="zh-CN" altLang="en-US" dirty="0"/>
-                <a:t> </a:t>
-              </a:r>
-              <a:r>
-                <a:rPr lang="en-US" altLang="zh-CN" dirty="0"/>
-                <a:t>still</a:t>
-              </a:r>
-              <a:r>
-                <a:rPr lang="zh-CN" altLang="en-US" dirty="0"/>
-                <a:t> </a:t>
-              </a:r>
-              <a:r>
-                <a:rPr lang="en-US" altLang="zh-CN" dirty="0"/>
-                <a:t>the</a:t>
-              </a:r>
-              <a:r>
-                <a:rPr lang="zh-CN" altLang="en-US" dirty="0"/>
-                <a:t> </a:t>
-              </a:r>
-              <a:r>
-                <a:rPr lang="en-US" altLang="zh-CN" dirty="0"/>
-                <a:t>same</a:t>
-              </a:r>
-              <a:r>
-                <a:rPr lang="zh-CN" altLang="en-US" dirty="0"/>
-                <a:t> </a:t>
-              </a:r>
-              <a:r>
-                <a:rPr lang="en-US" altLang="zh-CN" dirty="0"/>
-                <a:t>color</a:t>
-              </a:r>
-              <a:r>
-                <a:rPr lang="zh-CN" altLang="en-US" dirty="0"/>
-                <a:t> </a:t>
-              </a:r>
-              <a:r>
-                <a:rPr lang="en-US" altLang="zh-CN" dirty="0"/>
-                <a:t>card.</a:t>
-              </a:r>
-              <a:endParaRPr lang="en-US" dirty="0"/>
-            </a:p>
-          </p:txBody>
-        </p:sp>
-      </p:grpSp>
-      <p:sp>
-        <p:nvSpPr>
-          <p:cNvPr id="11" name="Rectangle 10">
-            <a:extLst>
-              <a:ext uri="{FF2B5EF4-FFF2-40B4-BE49-F238E27FC236}">
-                <a16:creationId xmlns:a16="http://schemas.microsoft.com/office/drawing/2014/main" id="{56C80A05-6D1A-56DC-8077-25A495ED8327}"/>
-              </a:ext>
-            </a:extLst>
-          </p:cNvPr>
-          <p:cNvSpPr/>
-          <p:nvPr/>
-        </p:nvSpPr>
-        <p:spPr>
-          <a:xfrm>
-            <a:off x="1875692" y="1629508"/>
-            <a:ext cx="3212123" cy="3647021"/>
-          </a:xfrm>
-          <a:prstGeom prst="rect">
-            <a:avLst/>
-          </a:prstGeom>
-          <a:noFill/>
-          <a:ln w="38100">
-            <a:solidFill>
-              <a:srgbClr val="C00000"/>
-            </a:solidFill>
-          </a:ln>
-        </p:spPr>
-        <p:style>
-          <a:lnRef idx="2">
-            <a:schemeClr val="accent1">
-              <a:shade val="15000"/>
-            </a:schemeClr>
-          </a:lnRef>
-          <a:fillRef idx="1">
-            <a:schemeClr val="accent1"/>
-          </a:fillRef>
-          <a:effectRef idx="0">
-            <a:schemeClr val="accent1"/>
-          </a:effectRef>
-          <a:fontRef idx="minor">
-            <a:schemeClr val="lt1"/>
-          </a:fontRef>
-        </p:style>
-        <p:txBody>
-          <a:bodyPr rtlCol="0" anchor="ctr"/>
-          <a:lstStyle/>
-          <a:p>
-            <a:pPr algn="ctr"/>
-            <a:endParaRPr lang="en-US"/>
-          </a:p>
-        </p:txBody>
-      </p:sp>
-      <p:pic>
-        <p:nvPicPr>
-          <p:cNvPr id="15" name="Audio 14">
-            <a:extLst>
-              <a:ext uri="{FF2B5EF4-FFF2-40B4-BE49-F238E27FC236}">
-                <a16:creationId xmlns:a16="http://schemas.microsoft.com/office/drawing/2014/main" id="{48B77AF6-A5FB-E7C6-8962-9AFB5C374643}"/>
-              </a:ext>
-            </a:extLst>
-          </p:cNvPr>
-          <p:cNvPicPr>
-            <a:picLocks noChangeAspect="1"/>
-          </p:cNvPicPr>
-          <p:nvPr>
-            <a:audioFile r:link="rId3"/>
-            <p:extLst>
-              <p:ext uri="{DAA4B4D4-6D71-4841-9C94-3DE7FCFB9230}">
-                <p14:media xmlns:p14="http://schemas.microsoft.com/office/powerpoint/2010/main" r:embed="rId2"/>
-              </p:ext>
-            </p:extLst>
-          </p:nvPr>
-        </p:nvPicPr>
-        <p:blipFill>
-          <a:blip r:embed="rId6"/>
-          <a:stretch>
-            <a:fillRect/>
-          </a:stretch>
-        </p:blipFill>
-        <p:spPr>
-          <a:xfrm>
-            <a:off x="11226800" y="5892800"/>
-            <a:ext cx="812800" cy="812800"/>
-          </a:xfrm>
-          <a:prstGeom prst="rect">
-            <a:avLst/>
-          </a:prstGeom>
-        </p:spPr>
-      </p:pic>
-    </p:spTree>
-    <p:custDataLst>
-      <p:tags r:id="rId1"/>
-    </p:custDataLst>
-    <p:extLst>
-      <p:ext uri="{BB962C8B-B14F-4D97-AF65-F5344CB8AC3E}">
-        <p14:creationId xmlns:p14="http://schemas.microsoft.com/office/powerpoint/2010/main" val="3971071564"/>
-      </p:ext>
-    </p:extLst>
-  </p:cSld>
-  <p:clrMapOvr>
-    <a:masterClrMapping/>
-  </p:clrMapOvr>
-  <mc:AlternateContent xmlns:mc="http://schemas.openxmlformats.org/markup-compatibility/2006" xmlns:p14="http://schemas.microsoft.com/office/powerpoint/2010/main">
-    <mc:Choice Requires="p14">
-      <p:transition spd="slow" p14:dur="2000" advTm="31506"/>
-    </mc:Choice>
-    <mc:Fallback xmlns="">
-      <p:transition spd="slow" advTm="31506"/>
-    </mc:Fallback>
-  </mc:AlternateContent>
-  <p:timing>
-    <p:tnLst>
-      <p:par>
-        <p:cTn id="1" dur="indefinite" restart="never" nodeType="tmRoot">
-          <p:childTnLst>
-            <p:seq concurrent="1" nextAc="seek">
-              <p:cTn id="2" dur="indefinite" nodeType="mainSeq">
-                <p:childTnLst>
-                  <p:par>
-                    <p:cTn id="3" fill="hold">
-                      <p:stCondLst>
-                        <p:cond delay="indefinite"/>
-                        <p:cond evt="onBegin" delay="0">
-                          <p:tn val="2"/>
-                        </p:cond>
-                      </p:stCondLst>
-                      <p:childTnLst>
-                        <p:par>
-                          <p:cTn id="4" fill="hold">
-                            <p:stCondLst>
-                              <p:cond delay="0"/>
-                            </p:stCondLst>
-                            <p:childTnLst>
-                              <p:par>
-                                <p:cTn id="5" presetID="1" presetClass="mediacall" presetSubtype="0" fill="hold" nodeType="afterEffect">
-                                  <p:stCondLst>
-                                    <p:cond delay="0"/>
-                                  </p:stCondLst>
-                                  <p:childTnLst>
-                                    <p:cmd type="call" cmd="playFrom(0.0)">
-                                      <p:cBhvr>
-                                        <p:cTn id="6" dur="1" fill="hold"/>
-                                        <p:tgtEl>
-                                          <p:spTgt spid="15"/>
-                                        </p:tgtEl>
-                                      </p:cBhvr>
-                                    </p:cmd>
-                                  </p:childTnLst>
-                                </p:cTn>
-                              </p:par>
-                            </p:childTnLst>
-                          </p:cTn>
-                        </p:par>
-                      </p:childTnLst>
-                    </p:cTn>
-                  </p:par>
-                  <p:par>
-                    <p:cTn id="7" fill="hold">
-                      <p:stCondLst>
-                        <p:cond delay="indefinite"/>
-                      </p:stCondLst>
-                      <p:childTnLst>
-                        <p:par>
-                          <p:cTn id="8" fill="hold">
-                            <p:stCondLst>
-                              <p:cond delay="0"/>
-                            </p:stCondLst>
-                            <p:childTnLst>
-                              <p:par>
-                                <p:cTn id="9" presetID="9" presetClass="entr" presetSubtype="0" fill="hold" grpId="0" nodeType="clickEffect">
-                                  <p:stCondLst>
-                                    <p:cond delay="0"/>
-                                  </p:stCondLst>
-                                  <p:childTnLst>
-                                    <p:set>
-                                      <p:cBhvr>
-                                        <p:cTn id="10" dur="1" fill="hold">
-                                          <p:stCondLst>
-                                            <p:cond delay="0"/>
-                                          </p:stCondLst>
-                                        </p:cTn>
-                                        <p:tgtEl>
-                                          <p:spTgt spid="11"/>
-                                        </p:tgtEl>
-                                        <p:attrNameLst>
-                                          <p:attrName>style.visibility</p:attrName>
-                                        </p:attrNameLst>
-                                      </p:cBhvr>
-                                      <p:to>
-                                        <p:strVal val="visible"/>
-                                      </p:to>
-                                    </p:set>
-                                    <p:animEffect transition="in" filter="dissolve">
-                                      <p:cBhvr>
-                                        <p:cTn id="11" dur="500"/>
-                                        <p:tgtEl>
-                                          <p:spTgt spid="11"/>
-                                        </p:tgtEl>
-                                      </p:cBhvr>
-                                    </p:animEffect>
-                                  </p:childTnLst>
-                                </p:cTn>
-                              </p:par>
-                            </p:childTnLst>
-                          </p:cTn>
-                        </p:par>
-                      </p:childTnLst>
-                    </p:cTn>
-                  </p:par>
-                </p:childTnLst>
-              </p:cTn>
-              <p:prevCondLst>
-                <p:cond evt="onPrev" delay="0">
-                  <p:tgtEl>
-                    <p:sldTgt/>
-                  </p:tgtEl>
-                </p:cond>
-              </p:prevCondLst>
-              <p:nextCondLst>
-                <p:cond evt="onNext" delay="0">
-                  <p:tgtEl>
-                    <p:sldTgt/>
-                  </p:tgtEl>
-                </p:cond>
-              </p:nextCondLst>
-            </p:seq>
-            <p:audio isNarration="1">
-              <p:cMediaNode vol="80000" showWhenStopped="0">
-                <p:cTn id="12" fill="hold" display="0">
-                  <p:stCondLst>
-                    <p:cond delay="indefinite"/>
-                  </p:stCondLst>
-                  <p:endCondLst>
-                    <p:cond evt="onStopAudio" delay="0">
-                      <p:tgtEl>
-                        <p:sldTgt/>
-                      </p:tgtEl>
-                    </p:cond>
-                  </p:endCondLst>
-                </p:cTn>
-                <p:tgtEl>
-                  <p:spTgt spid="15"/>
-                </p:tgtEl>
-              </p:cMediaNode>
-            </p:audio>
-          </p:childTnLst>
-        </p:cTn>
-      </p:par>
-    </p:tnLst>
-    <p:bldLst>
-      <p:bldP spid="11" grpId="0" animBg="1"/>
-    </p:bldLst>
-  </p:timing>
-</p:sld>
-</file>
-
-<file path=ppt/slides/slide3.xml><?xml version="1.0" encoding="utf-8"?>
 <p:sld xmlns:a="http://schemas.openxmlformats.org/drawingml/2006/main" xmlns:r="http://schemas.openxmlformats.org/officeDocument/2006/relationships" xmlns:p="http://schemas.openxmlformats.org/presentationml/2006/main">
   <p:cSld>
     <p:spTree>
@@ -8871,10 +7182,10 @@
       </p:sp>
       <p:pic>
         <p:nvPicPr>
-          <p:cNvPr id="22" name="Audio 21">
+          <p:cNvPr id="28" name="Audio 27">
             <a:extLst>
               <a:ext uri="{FF2B5EF4-FFF2-40B4-BE49-F238E27FC236}">
-                <a16:creationId xmlns:a16="http://schemas.microsoft.com/office/drawing/2014/main" id="{A3F17E44-AC7E-8627-56AB-B37D2409AC32}"/>
+                <a16:creationId xmlns:a16="http://schemas.microsoft.com/office/drawing/2014/main" id="{5A7BB7ED-B740-5381-7331-094D73D98408}"/>
               </a:ext>
             </a:extLst>
           </p:cNvPr>
@@ -8916,12 +7227,12 @@
   <p:clrMapOvr>
     <a:masterClrMapping/>
   </p:clrMapOvr>
-  <mc:AlternateContent xmlns:mc="http://schemas.openxmlformats.org/markup-compatibility/2006" xmlns:p14="http://schemas.microsoft.com/office/powerpoint/2010/main">
-    <mc:Choice Requires="p14">
-      <p:transition spd="slow" p14:dur="2000" advTm="27150"/>
+  <mc:AlternateContent xmlns:mc="http://schemas.openxmlformats.org/markup-compatibility/2006">
+    <mc:Choice xmlns:p14="http://schemas.microsoft.com/office/powerpoint/2010/main" Requires="p14">
+      <p:transition spd="slow" p14:dur="2000" advTm="25070"/>
     </mc:Choice>
-    <mc:Fallback xmlns="">
-      <p:transition spd="slow" advTm="27150"/>
+    <mc:Fallback>
+      <p:transition spd="slow" advTm="25070"/>
     </mc:Fallback>
   </mc:AlternateContent>
   <p:timing>
@@ -8957,7 +7268,7 @@
                                       <p:cBhvr>
                                         <p:cTn id="6" dur="1" fill="hold"/>
                                         <p:tgtEl>
-                                          <p:spTgt spid="22"/>
+                                          <p:spTgt spid="28"/>
                                         </p:tgtEl>
                                       </p:cBhvr>
                                     </p:cmd>
@@ -9002,7 +7313,7 @@
                   </p:endCondLst>
                 </p:cTn>
                 <p:tgtEl>
-                  <p:spTgt spid="22"/>
+                  <p:spTgt spid="28"/>
                 </p:tgtEl>
               </p:cMediaNode>
             </p:audio>
@@ -9014,7 +7325,7 @@
 </p:sld>
 </file>
 
-<file path=ppt/slides/slide4.xml><?xml version="1.0" encoding="utf-8"?>
+<file path=ppt/slides/slide3.xml><?xml version="1.0" encoding="utf-8"?>
 <p:sld xmlns:a="http://schemas.openxmlformats.org/drawingml/2006/main" xmlns:r="http://schemas.openxmlformats.org/officeDocument/2006/relationships" xmlns:p="http://schemas.openxmlformats.org/presentationml/2006/main">
   <p:cSld>
     <p:spTree>
@@ -9939,12 +8250,6 @@
 <file path=ppt/tags/tag1.xml><?xml version="1.0" encoding="utf-8"?>
 <p:tagLst xmlns:a="http://schemas.openxmlformats.org/drawingml/2006/main" xmlns:r="http://schemas.openxmlformats.org/officeDocument/2006/relationships" xmlns:p="http://schemas.openxmlformats.org/presentationml/2006/main">
   <p:tag name="TIMING" val="|20.7"/>
-</p:tagLst>
-</file>
-
-<file path=ppt/tags/tag2.xml><?xml version="1.0" encoding="utf-8"?>
-<p:tagLst xmlns:a="http://schemas.openxmlformats.org/drawingml/2006/main" xmlns:r="http://schemas.openxmlformats.org/officeDocument/2006/relationships" xmlns:p="http://schemas.openxmlformats.org/presentationml/2006/main">
-  <p:tag name="TIMING" val="|24.4"/>
 </p:tagLst>
 </file>
 

</xml_diff>